<commit_message>
Added slides (and an image) to explain event hooks
</commit_message>
<xml_diff>
--- a/Amazon Code Deploy - Zero Down-Time, Automated Deployments.pptx
+++ b/Amazon Code Deploy - Zero Down-Time, Automated Deployments.pptx
@@ -5,7 +5,7 @@
     <p:sldMasterId id="2147483960" r:id="rId1"/>
   </p:sldMasterIdLst>
   <p:notesMasterIdLst>
-    <p:notesMasterId r:id="rId10"/>
+    <p:notesMasterId r:id="rId12"/>
   </p:notesMasterIdLst>
   <p:sldIdLst>
     <p:sldId id="256" r:id="rId2"/>
@@ -15,7 +15,9 @@
     <p:sldId id="261" r:id="rId6"/>
     <p:sldId id="262" r:id="rId7"/>
     <p:sldId id="263" r:id="rId8"/>
-    <p:sldId id="257" r:id="rId9"/>
+    <p:sldId id="264" r:id="rId9"/>
+    <p:sldId id="265" r:id="rId10"/>
+    <p:sldId id="257" r:id="rId11"/>
   </p:sldIdLst>
   <p:sldSz cx="12192000" cy="6858000"/>
   <p:notesSz cx="6858000" cy="9144000"/>
@@ -116,7 +118,7 @@
   </p:defaultTextStyle>
   <p:extLst>
     <p:ext uri="{EFAFB233-063F-42B5-8137-9DF3F51BA10A}">
-      <p15:sldGuideLst xmlns:p15="http://schemas.microsoft.com/office/powerpoint/2012/main" xmlns="">
+      <p15:sldGuideLst xmlns="" xmlns:p15="http://schemas.microsoft.com/office/powerpoint/2012/main">
         <p15:guide id="1" orient="horz" pos="2160" userDrawn="1">
           <p15:clr>
             <a:srgbClr val="A4A3A4"/>
@@ -223,7 +225,7 @@
           <a:p>
             <a:fld id="{52F82EA8-271C-D440-8460-3278DBA1949D}" type="datetimeFigureOut">
               <a:rPr lang="en-US" smtClean="0"/>
-              <a:t>11/9/2015</a:t>
+              <a:t>11/10/2015</a:t>
             </a:fld>
             <a:endParaRPr lang="en-US"/>
           </a:p>
@@ -812,6 +814,90 @@
           <a:bodyPr/>
           <a:lstStyle/>
           <a:p>
+            <a:endParaRPr lang="en-US" dirty="0"/>
+          </a:p>
+        </p:txBody>
+      </p:sp>
+      <p:sp>
+        <p:nvSpPr>
+          <p:cNvPr id="4" name="Slide Number Placeholder 3"/>
+          <p:cNvSpPr>
+            <a:spLocks noGrp="1"/>
+          </p:cNvSpPr>
+          <p:nvPr>
+            <p:ph type="sldNum" sz="quarter" idx="10"/>
+          </p:nvPr>
+        </p:nvSpPr>
+        <p:spPr/>
+        <p:txBody>
+          <a:bodyPr/>
+          <a:lstStyle/>
+          <a:p>
+            <a:fld id="{B27CD185-A1DB-E44E-8F62-E743C8ECDF98}" type="slidenum">
+              <a:rPr lang="en-US" smtClean="0"/>
+              <a:t>6</a:t>
+            </a:fld>
+            <a:endParaRPr lang="en-US"/>
+          </a:p>
+        </p:txBody>
+      </p:sp>
+    </p:spTree>
+    <p:extLst>
+      <p:ext uri="{BB962C8B-B14F-4D97-AF65-F5344CB8AC3E}">
+        <p14:creationId xmlns:p14="http://schemas.microsoft.com/office/powerpoint/2010/main" val="3236883469"/>
+      </p:ext>
+    </p:extLst>
+  </p:cSld>
+  <p:clrMapOvr>
+    <a:masterClrMapping/>
+  </p:clrMapOvr>
+</p:notes>
+</file>
+
+<file path=ppt/notesSlides/notesSlide4.xml><?xml version="1.0" encoding="utf-8"?>
+<p:notes xmlns:a="http://schemas.openxmlformats.org/drawingml/2006/main" xmlns:r="http://schemas.openxmlformats.org/officeDocument/2006/relationships" xmlns:p="http://schemas.openxmlformats.org/presentationml/2006/main">
+  <p:cSld>
+    <p:spTree>
+      <p:nvGrpSpPr>
+        <p:cNvPr id="1" name=""/>
+        <p:cNvGrpSpPr/>
+        <p:nvPr/>
+      </p:nvGrpSpPr>
+      <p:grpSpPr>
+        <a:xfrm>
+          <a:off x="0" y="0"/>
+          <a:ext cx="0" cy="0"/>
+          <a:chOff x="0" y="0"/>
+          <a:chExt cx="0" cy="0"/>
+        </a:xfrm>
+      </p:grpSpPr>
+      <p:sp>
+        <p:nvSpPr>
+          <p:cNvPr id="2" name="Slide Image Placeholder 1"/>
+          <p:cNvSpPr>
+            <a:spLocks noGrp="1" noRot="1" noChangeAspect="1"/>
+          </p:cNvSpPr>
+          <p:nvPr>
+            <p:ph type="sldImg"/>
+          </p:nvPr>
+        </p:nvSpPr>
+        <p:spPr/>
+      </p:sp>
+      <p:sp>
+        <p:nvSpPr>
+          <p:cNvPr id="3" name="Notes Placeholder 2"/>
+          <p:cNvSpPr>
+            <a:spLocks noGrp="1"/>
+          </p:cNvSpPr>
+          <p:nvPr>
+            <p:ph type="body" idx="1"/>
+          </p:nvPr>
+        </p:nvSpPr>
+        <p:spPr/>
+        <p:txBody>
+          <a:bodyPr/>
+          <a:lstStyle/>
+          <a:p>
             <a:pPr marL="228600" indent="-228600">
               <a:buFont typeface="+mj-lt"/>
               <a:buAutoNum type="arabicPeriod"/>
@@ -934,6 +1020,121 @@
     <p:extLst>
       <p:ext uri="{BB962C8B-B14F-4D97-AF65-F5344CB8AC3E}">
         <p14:creationId xmlns:p14="http://schemas.microsoft.com/office/powerpoint/2010/main" val="683373066"/>
+      </p:ext>
+    </p:extLst>
+  </p:cSld>
+  <p:clrMapOvr>
+    <a:masterClrMapping/>
+  </p:clrMapOvr>
+</p:notes>
+</file>
+
+<file path=ppt/notesSlides/notesSlide5.xml><?xml version="1.0" encoding="utf-8"?>
+<p:notes xmlns:a="http://schemas.openxmlformats.org/drawingml/2006/main" xmlns:r="http://schemas.openxmlformats.org/officeDocument/2006/relationships" xmlns:p="http://schemas.openxmlformats.org/presentationml/2006/main">
+  <p:cSld>
+    <p:spTree>
+      <p:nvGrpSpPr>
+        <p:cNvPr id="1" name=""/>
+        <p:cNvGrpSpPr/>
+        <p:nvPr/>
+      </p:nvGrpSpPr>
+      <p:grpSpPr>
+        <a:xfrm>
+          <a:off x="0" y="0"/>
+          <a:ext cx="0" cy="0"/>
+          <a:chOff x="0" y="0"/>
+          <a:chExt cx="0" cy="0"/>
+        </a:xfrm>
+      </p:grpSpPr>
+      <p:sp>
+        <p:nvSpPr>
+          <p:cNvPr id="2" name="Slide Image Placeholder 1"/>
+          <p:cNvSpPr>
+            <a:spLocks noGrp="1" noRot="1" noChangeAspect="1"/>
+          </p:cNvSpPr>
+          <p:nvPr>
+            <p:ph type="sldImg"/>
+          </p:nvPr>
+        </p:nvSpPr>
+        <p:spPr/>
+      </p:sp>
+      <p:sp>
+        <p:nvSpPr>
+          <p:cNvPr id="3" name="Notes Placeholder 2"/>
+          <p:cNvSpPr>
+            <a:spLocks noGrp="1"/>
+          </p:cNvSpPr>
+          <p:nvPr>
+            <p:ph type="body" idx="1"/>
+          </p:nvPr>
+        </p:nvSpPr>
+        <p:spPr/>
+        <p:txBody>
+          <a:bodyPr/>
+          <a:lstStyle/>
+          <a:p>
+            <a:pPr marL="0" marR="0" indent="0" algn="l" defTabSz="457200" rtl="0" eaLnBrk="1" fontAlgn="auto" latinLnBrk="0" hangingPunct="1">
+              <a:lnSpc>
+                <a:spcPct val="100000"/>
+              </a:lnSpc>
+              <a:spcBef>
+                <a:spcPts val="0"/>
+              </a:spcBef>
+              <a:spcAft>
+                <a:spcPts val="0"/>
+              </a:spcAft>
+              <a:buClrTx/>
+              <a:buSzTx/>
+              <a:buFontTx/>
+              <a:buNone/>
+              <a:tabLst/>
+              <a:defRPr/>
+            </a:pPr>
+            <a:r>
+              <a:rPr lang="en-US" dirty="0" smtClean="0"/>
+              <a:t>NOTE: The </a:t>
+            </a:r>
+            <a:r>
+              <a:rPr lang="en-US" dirty="0" err="1" smtClean="0"/>
+              <a:t>ApplicationStop</a:t>
+            </a:r>
+            <a:r>
+              <a:rPr lang="en-US" dirty="0" smtClean="0"/>
+              <a:t> script from the previous revision is what's actually run.</a:t>
+            </a:r>
+          </a:p>
+          <a:p>
+            <a:endParaRPr lang="en-US" dirty="0"/>
+          </a:p>
+        </p:txBody>
+      </p:sp>
+      <p:sp>
+        <p:nvSpPr>
+          <p:cNvPr id="4" name="Slide Number Placeholder 3"/>
+          <p:cNvSpPr>
+            <a:spLocks noGrp="1"/>
+          </p:cNvSpPr>
+          <p:nvPr>
+            <p:ph type="sldNum" sz="quarter" idx="10"/>
+          </p:nvPr>
+        </p:nvSpPr>
+        <p:spPr/>
+        <p:txBody>
+          <a:bodyPr/>
+          <a:lstStyle/>
+          <a:p>
+            <a:fld id="{B27CD185-A1DB-E44E-8F62-E743C8ECDF98}" type="slidenum">
+              <a:rPr lang="en-US" smtClean="0"/>
+              <a:t>9</a:t>
+            </a:fld>
+            <a:endParaRPr lang="en-US"/>
+          </a:p>
+        </p:txBody>
+      </p:sp>
+    </p:spTree>
+    <p:extLst>
+      <p:ext uri="{BB962C8B-B14F-4D97-AF65-F5344CB8AC3E}">
+        <p14:creationId xmlns:p14="http://schemas.microsoft.com/office/powerpoint/2010/main" val="374010971"/>
       </p:ext>
     </p:extLst>
   </p:cSld>
@@ -1176,7 +1377,7 @@
           <a:p>
             <a:fld id="{C8A432C8-69A7-458B-9684-2BFA64B31948}" type="datetime2">
               <a:rPr lang="en-US" smtClean="0"/>
-              <a:t>Monday, November 09, 2015</a:t>
+              <a:t>Tuesday, November 10, 2015</a:t>
             </a:fld>
             <a:endParaRPr lang="en-US"/>
           </a:p>
@@ -1415,7 +1616,7 @@
           <a:p>
             <a:fld id="{8CC057FC-95B6-4D89-AFDA-ABA33EE921E5}" type="datetime2">
               <a:rPr lang="en-US" smtClean="0"/>
-              <a:t>Monday, November 09, 2015</a:t>
+              <a:t>Tuesday, November 10, 2015</a:t>
             </a:fld>
             <a:endParaRPr lang="en-US"/>
           </a:p>
@@ -1592,7 +1793,7 @@
           <a:p>
             <a:fld id="{EC4549AC-EB31-477F-92A9-B1988E232878}" type="datetime2">
               <a:rPr lang="en-US" smtClean="0"/>
-              <a:t>Monday, November 09, 2015</a:t>
+              <a:t>Tuesday, November 10, 2015</a:t>
             </a:fld>
             <a:endParaRPr lang="en-US"/>
           </a:p>
@@ -1795,7 +1996,7 @@
           <a:p>
             <a:fld id="{6396A3A3-94A6-4E5B-AF39-173ACA3E61CC}" type="datetime2">
               <a:rPr lang="en-US" smtClean="0"/>
-              <a:t>Monday, November 09, 2015</a:t>
+              <a:t>Tuesday, November 10, 2015</a:t>
             </a:fld>
             <a:endParaRPr lang="en-US"/>
           </a:p>
@@ -2045,7 +2246,7 @@
           <a:p>
             <a:fld id="{9933D019-A32C-4EAD-B8E6-DBDA699692FD}" type="datetime2">
               <a:rPr lang="en-US" smtClean="0"/>
-              <a:t>Monday, November 09, 2015</a:t>
+              <a:t>Tuesday, November 10, 2015</a:t>
             </a:fld>
             <a:endParaRPr lang="en-US"/>
           </a:p>
@@ -2359,7 +2560,7 @@
           <a:p>
             <a:fld id="{CCEBA98F-560C-4997-81C4-81D4D9187EAB}" type="datetime2">
               <a:rPr lang="en-US" smtClean="0"/>
-              <a:t>Monday, November 09, 2015</a:t>
+              <a:t>Tuesday, November 10, 2015</a:t>
             </a:fld>
             <a:endParaRPr lang="en-US"/>
           </a:p>
@@ -2827,7 +3028,7 @@
           <a:p>
             <a:fld id="{150972B2-CA5C-437D-87D0-8081271A9E4B}" type="datetime2">
               <a:rPr lang="en-US" smtClean="0"/>
-              <a:t>Monday, November 09, 2015</a:t>
+              <a:t>Tuesday, November 10, 2015</a:t>
             </a:fld>
             <a:endParaRPr lang="en-US"/>
           </a:p>
@@ -2977,7 +3178,7 @@
           <a:p>
             <a:fld id="{79CD4847-11EF-4466-A8AD-85CDB7B49118}" type="datetime2">
               <a:rPr lang="en-US" smtClean="0"/>
-              <a:t>Monday, November 09, 2015</a:t>
+              <a:t>Tuesday, November 10, 2015</a:t>
             </a:fld>
             <a:endParaRPr lang="en-US"/>
           </a:p>
@@ -3069,7 +3270,7 @@
           <a:p>
             <a:fld id="{F168457A-3AB9-4880-8A0C-9F8524491207}" type="datetime2">
               <a:rPr lang="en-US" smtClean="0"/>
-              <a:t>Monday, November 09, 2015</a:t>
+              <a:t>Tuesday, November 10, 2015</a:t>
             </a:fld>
             <a:endParaRPr lang="en-US"/>
           </a:p>
@@ -3345,7 +3546,7 @@
           <a:p>
             <a:fld id="{3FE976D3-5B7F-4300-ABED-C91F1B2AE209}" type="datetime2">
               <a:rPr lang="en-US" smtClean="0"/>
-              <a:t>Monday, November 09, 2015</a:t>
+              <a:t>Tuesday, November 10, 2015</a:t>
             </a:fld>
             <a:endParaRPr lang="en-US"/>
           </a:p>
@@ -3652,7 +3853,7 @@
           <a:p>
             <a:fld id="{EBDC1E59-17DD-41CE-97CA-624A472382D4}" type="datetime2">
               <a:rPr lang="en-US" smtClean="0"/>
-              <a:t>Monday, November 09, 2015</a:t>
+              <a:t>Tuesday, November 10, 2015</a:t>
             </a:fld>
             <a:endParaRPr lang="en-US"/>
           </a:p>
@@ -3936,7 +4137,7 @@
           <a:p>
             <a:fld id="{A80CB818-7379-467D-8E76-EF9D9074A26C}" type="datetime2">
               <a:rPr lang="en-US" smtClean="0"/>
-              <a:t>Monday, November 09, 2015</a:t>
+              <a:t>Tuesday, November 10, 2015</a:t>
             </a:fld>
             <a:endParaRPr lang="en-US" dirty="0"/>
           </a:p>
@@ -4413,6 +4614,90 @@
 </p:sld>
 </file>
 
+<file path=ppt/slides/slide10.xml><?xml version="1.0" encoding="utf-8"?>
+<p:sld xmlns:a="http://schemas.openxmlformats.org/drawingml/2006/main" xmlns:r="http://schemas.openxmlformats.org/officeDocument/2006/relationships" xmlns:p="http://schemas.openxmlformats.org/presentationml/2006/main">
+  <p:cSld>
+    <p:spTree>
+      <p:nvGrpSpPr>
+        <p:cNvPr id="1" name=""/>
+        <p:cNvGrpSpPr/>
+        <p:nvPr/>
+      </p:nvGrpSpPr>
+      <p:grpSpPr>
+        <a:xfrm>
+          <a:off x="0" y="0"/>
+          <a:ext cx="0" cy="0"/>
+          <a:chOff x="0" y="0"/>
+          <a:chExt cx="0" cy="0"/>
+        </a:xfrm>
+      </p:grpSpPr>
+      <p:sp>
+        <p:nvSpPr>
+          <p:cNvPr id="2" name="Title 1"/>
+          <p:cNvSpPr>
+            <a:spLocks noGrp="1"/>
+          </p:cNvSpPr>
+          <p:nvPr>
+            <p:ph type="title"/>
+          </p:nvPr>
+        </p:nvSpPr>
+        <p:spPr>
+          <a:xfrm>
+            <a:off x="963084" y="1052187"/>
+            <a:ext cx="10363200" cy="3510290"/>
+          </a:xfrm>
+        </p:spPr>
+        <p:txBody>
+          <a:bodyPr/>
+          <a:lstStyle/>
+          <a:p>
+            <a:r>
+              <a:rPr lang="en-US" dirty="0" smtClean="0"/>
+              <a:t>Demo</a:t>
+            </a:r>
+            <a:endParaRPr lang="en-US" dirty="0"/>
+          </a:p>
+        </p:txBody>
+      </p:sp>
+      <p:sp>
+        <p:nvSpPr>
+          <p:cNvPr id="3" name="Text Placeholder 2"/>
+          <p:cNvSpPr>
+            <a:spLocks noGrp="1"/>
+          </p:cNvSpPr>
+          <p:nvPr>
+            <p:ph type="body" idx="1"/>
+          </p:nvPr>
+        </p:nvSpPr>
+        <p:spPr/>
+        <p:txBody>
+          <a:bodyPr/>
+          <a:lstStyle/>
+          <a:p>
+            <a:endParaRPr lang="en-US" dirty="0"/>
+          </a:p>
+        </p:txBody>
+      </p:sp>
+    </p:spTree>
+    <p:extLst>
+      <p:ext uri="{BB962C8B-B14F-4D97-AF65-F5344CB8AC3E}">
+        <p14:creationId xmlns:p14="http://schemas.microsoft.com/office/powerpoint/2010/main" val="2143654922"/>
+      </p:ext>
+    </p:extLst>
+  </p:cSld>
+  <p:clrMapOvr>
+    <a:masterClrMapping/>
+  </p:clrMapOvr>
+  <p:timing>
+    <p:tnLst>
+      <p:par>
+        <p:cTn id="1" dur="indefinite" restart="never" nodeType="tmRoot"/>
+      </p:par>
+    </p:tnLst>
+  </p:timing>
+</p:sld>
+</file>
+
 <file path=ppt/slides/slide2.xml><?xml version="1.0" encoding="utf-8"?>
 <p:sld xmlns:a="http://schemas.openxmlformats.org/drawingml/2006/main" xmlns:r="http://schemas.openxmlformats.org/officeDocument/2006/relationships" xmlns:p="http://schemas.openxmlformats.org/presentationml/2006/main">
   <p:cSld>
@@ -4488,11 +4773,7 @@
           <a:p>
             <a:r>
               <a:rPr lang="en-US" dirty="0" smtClean="0"/>
-              <a:t>Setup </a:t>
-            </a:r>
-            <a:r>
-              <a:rPr lang="en-US" dirty="0" smtClean="0"/>
-              <a:t>Work</a:t>
+              <a:t>Setup Work</a:t>
             </a:r>
           </a:p>
           <a:p>
@@ -5200,11 +5481,7 @@
           <a:p>
             <a:r>
               <a:rPr lang="en-US" dirty="0" smtClean="0"/>
-              <a:t>Zero </a:t>
-            </a:r>
-            <a:r>
-              <a:rPr lang="en-US" dirty="0" smtClean="0"/>
-              <a:t>Down-Time</a:t>
+              <a:t>Zero Down-Time</a:t>
             </a:r>
           </a:p>
           <a:p>
@@ -5928,7 +6205,6 @@
               <a:rPr lang="en-US" dirty="0"/>
               <a:t>)</a:t>
             </a:r>
-            <a:endParaRPr lang="en-US" dirty="0"/>
           </a:p>
         </p:txBody>
       </p:sp>
@@ -7370,8 +7646,13 @@
             </a:r>
             <a:r>
               <a:rPr lang="en-US" dirty="0" smtClean="0"/>
-              <a:t> and event scripts</a:t>
-            </a:r>
+              <a:t> and event </a:t>
+            </a:r>
+            <a:r>
+              <a:rPr lang="en-US" dirty="0" smtClean="0"/>
+              <a:t>scripts</a:t>
+            </a:r>
+            <a:endParaRPr lang="en-US" dirty="0"/>
           </a:p>
           <a:p>
             <a:pPr marL="457200" indent="-457200">
@@ -7380,7 +7661,11 @@
             </a:pPr>
             <a:r>
               <a:rPr lang="en-US" dirty="0" smtClean="0"/>
-              <a:t>Create and distribute code-signing certificate for PowerShell scripts</a:t>
+              <a:t>Create </a:t>
+            </a:r>
+            <a:r>
+              <a:rPr lang="en-US" dirty="0" smtClean="0"/>
+              <a:t>and distribute code-signing certificate for PowerShell scripts</a:t>
             </a:r>
             <a:endParaRPr lang="en-US" dirty="0"/>
           </a:p>
@@ -8779,60 +9064,368 @@
             <p:ph type="title"/>
           </p:nvPr>
         </p:nvSpPr>
-        <p:spPr>
-          <a:xfrm>
-            <a:off x="963084" y="1052187"/>
-            <a:ext cx="10363200" cy="3510290"/>
-          </a:xfrm>
-        </p:spPr>
-        <p:txBody>
-          <a:bodyPr/>
-          <a:lstStyle/>
-          <a:p>
-            <a:r>
-              <a:rPr lang="en-US" dirty="0" smtClean="0"/>
-              <a:t>Demo</a:t>
-            </a:r>
-            <a:endParaRPr lang="en-US" dirty="0"/>
-          </a:p>
-        </p:txBody>
-      </p:sp>
-      <p:sp>
-        <p:nvSpPr>
-          <p:cNvPr id="3" name="Text Placeholder 2"/>
-          <p:cNvSpPr>
-            <a:spLocks noGrp="1"/>
-          </p:cNvSpPr>
-          <p:nvPr>
-            <p:ph type="body" idx="1"/>
-          </p:nvPr>
-        </p:nvSpPr>
         <p:spPr/>
         <p:txBody>
           <a:bodyPr/>
           <a:lstStyle/>
           <a:p>
+            <a:r>
+              <a:rPr lang="en-US" dirty="0" smtClean="0"/>
+              <a:t>Amazon Code Deploy – </a:t>
+            </a:r>
+            <a:r>
+              <a:rPr lang="en-US" dirty="0" err="1" smtClean="0"/>
+              <a:t>AppSpec.ym</a:t>
+            </a:r>
+            <a:r>
+              <a:rPr lang="en-US" dirty="0" err="1"/>
+              <a:t>l</a:t>
+            </a:r>
             <a:endParaRPr lang="en-US" dirty="0"/>
+          </a:p>
+        </p:txBody>
+      </p:sp>
+      <p:sp>
+        <p:nvSpPr>
+          <p:cNvPr id="3" name="Content Placeholder 2"/>
+          <p:cNvSpPr>
+            <a:spLocks noGrp="1"/>
+          </p:cNvSpPr>
+          <p:nvPr>
+            <p:ph idx="1"/>
+          </p:nvPr>
+        </p:nvSpPr>
+        <p:spPr/>
+        <p:txBody>
+          <a:bodyPr/>
+          <a:lstStyle/>
+          <a:p>
+            <a:pPr marL="0" indent="0">
+              <a:buNone/>
+            </a:pPr>
+            <a:r>
+              <a:rPr lang="en-US" dirty="0"/>
+              <a:t>version: </a:t>
+            </a:r>
+            <a:r>
+              <a:rPr lang="en-US" i="1" dirty="0"/>
+              <a:t>0.0</a:t>
+            </a:r>
+            <a:r>
+              <a:rPr lang="en-US" dirty="0"/>
+              <a:t/>
+            </a:r>
+            <a:br>
+              <a:rPr lang="en-US" dirty="0"/>
+            </a:br>
+            <a:r>
+              <a:rPr lang="en-US" dirty="0" err="1"/>
+              <a:t>os</a:t>
+            </a:r>
+            <a:r>
+              <a:rPr lang="en-US" dirty="0"/>
+              <a:t>: </a:t>
+            </a:r>
+            <a:r>
+              <a:rPr lang="en-US" i="1" dirty="0"/>
+              <a:t>operating-system-name</a:t>
+            </a:r>
+            <a:r>
+              <a:rPr lang="en-US" dirty="0"/>
+              <a:t/>
+            </a:r>
+            <a:br>
+              <a:rPr lang="en-US" dirty="0"/>
+            </a:br>
+            <a:r>
+              <a:rPr lang="en-US" dirty="0"/>
+              <a:t>files:</a:t>
+            </a:r>
+            <a:br>
+              <a:rPr lang="en-US" dirty="0"/>
+            </a:br>
+            <a:r>
+              <a:rPr lang="en-US" dirty="0"/>
+              <a:t>  </a:t>
+            </a:r>
+            <a:r>
+              <a:rPr lang="en-US" i="1" dirty="0"/>
+              <a:t>source-destination-files-mappings</a:t>
+            </a:r>
+            <a:r>
+              <a:rPr lang="en-US" dirty="0"/>
+              <a:t/>
+            </a:r>
+            <a:br>
+              <a:rPr lang="en-US" dirty="0"/>
+            </a:br>
+            <a:r>
+              <a:rPr lang="en-US" dirty="0"/>
+              <a:t>permissions:</a:t>
+            </a:r>
+            <a:br>
+              <a:rPr lang="en-US" dirty="0"/>
+            </a:br>
+            <a:r>
+              <a:rPr lang="en-US" dirty="0"/>
+              <a:t>  </a:t>
+            </a:r>
+            <a:r>
+              <a:rPr lang="en-US" i="1" dirty="0"/>
+              <a:t>permissions-specifications</a:t>
+            </a:r>
+            <a:r>
+              <a:rPr lang="en-US" dirty="0"/>
+              <a:t/>
+            </a:r>
+            <a:br>
+              <a:rPr lang="en-US" dirty="0"/>
+            </a:br>
+            <a:r>
+              <a:rPr lang="en-US" dirty="0"/>
+              <a:t>hooks:</a:t>
+            </a:r>
+            <a:br>
+              <a:rPr lang="en-US" dirty="0"/>
+            </a:br>
+            <a:r>
+              <a:rPr lang="en-US" dirty="0"/>
+              <a:t>  </a:t>
+            </a:r>
+            <a:r>
+              <a:rPr lang="en-US" i="1" dirty="0" smtClean="0"/>
+              <a:t>deployment-lifecycle-event-mappings</a:t>
+            </a:r>
+          </a:p>
+          <a:p>
+            <a:pPr marL="0" indent="0">
+              <a:buNone/>
+            </a:pPr>
+            <a:endParaRPr lang="en-US" i="1" dirty="0"/>
+          </a:p>
+          <a:p>
+            <a:pPr marL="0" indent="0">
+              <a:buNone/>
+            </a:pPr>
+            <a:r>
+              <a:rPr lang="en-US" sz="1400" dirty="0" smtClean="0"/>
+              <a:t>Reference</a:t>
+            </a:r>
+            <a:r>
+              <a:rPr lang="en-US" sz="1800" i="1" dirty="0" smtClean="0"/>
+              <a:t>: </a:t>
+            </a:r>
+            <a:r>
+              <a:rPr lang="en-US" sz="1800" dirty="0">
+                <a:hlinkClick r:id="rId2"/>
+              </a:rPr>
+              <a:t>http://docs.aws.amazon.com/codedeploy/latest/userguide/app-spec-ref.html</a:t>
+            </a:r>
+            <a:endParaRPr lang="en-US" sz="1800" dirty="0"/>
+          </a:p>
+          <a:p>
+            <a:pPr marL="0" indent="0">
+              <a:buNone/>
+            </a:pPr>
+            <a:endParaRPr lang="en-US" i="1" dirty="0"/>
           </a:p>
         </p:txBody>
       </p:sp>
     </p:spTree>
     <p:extLst>
       <p:ext uri="{BB962C8B-B14F-4D97-AF65-F5344CB8AC3E}">
-        <p14:creationId xmlns:p14="http://schemas.microsoft.com/office/powerpoint/2010/main" val="2143654922"/>
+        <p14:creationId xmlns:p14="http://schemas.microsoft.com/office/powerpoint/2010/main" val="1207915545"/>
       </p:ext>
     </p:extLst>
   </p:cSld>
   <p:clrMapOvr>
     <a:masterClrMapping/>
   </p:clrMapOvr>
-  <p:timing>
-    <p:tnLst>
-      <p:par>
-        <p:cTn id="1" dur="indefinite" restart="never" nodeType="tmRoot"/>
-      </p:par>
-    </p:tnLst>
-  </p:timing>
+</p:sld>
+</file>
+
+<file path=ppt/slides/slide9.xml><?xml version="1.0" encoding="utf-8"?>
+<p:sld xmlns:a="http://schemas.openxmlformats.org/drawingml/2006/main" xmlns:r="http://schemas.openxmlformats.org/officeDocument/2006/relationships" xmlns:p="http://schemas.openxmlformats.org/presentationml/2006/main">
+  <p:cSld>
+    <p:spTree>
+      <p:nvGrpSpPr>
+        <p:cNvPr id="1" name=""/>
+        <p:cNvGrpSpPr/>
+        <p:nvPr/>
+      </p:nvGrpSpPr>
+      <p:grpSpPr>
+        <a:xfrm>
+          <a:off x="0" y="0"/>
+          <a:ext cx="0" cy="0"/>
+          <a:chOff x="0" y="0"/>
+          <a:chExt cx="0" cy="0"/>
+        </a:xfrm>
+      </p:grpSpPr>
+      <p:sp>
+        <p:nvSpPr>
+          <p:cNvPr id="2" name="Title 1"/>
+          <p:cNvSpPr>
+            <a:spLocks noGrp="1"/>
+          </p:cNvSpPr>
+          <p:nvPr>
+            <p:ph type="title"/>
+          </p:nvPr>
+        </p:nvSpPr>
+        <p:spPr/>
+        <p:txBody>
+          <a:bodyPr/>
+          <a:lstStyle/>
+          <a:p>
+            <a:r>
+              <a:rPr lang="en-US" dirty="0" smtClean="0"/>
+              <a:t>Amazon Code Deploy – </a:t>
+            </a:r>
+            <a:r>
+              <a:rPr lang="en-US" dirty="0" err="1" smtClean="0"/>
+              <a:t>AppSpec.yml</a:t>
+            </a:r>
+            <a:r>
+              <a:rPr lang="en-US" dirty="0" smtClean="0"/>
+              <a:t> Events</a:t>
+            </a:r>
+            <a:endParaRPr lang="en-US" dirty="0"/>
+          </a:p>
+        </p:txBody>
+      </p:sp>
+      <p:sp>
+        <p:nvSpPr>
+          <p:cNvPr id="3" name="Content Placeholder 2"/>
+          <p:cNvSpPr>
+            <a:spLocks noGrp="1"/>
+          </p:cNvSpPr>
+          <p:nvPr>
+            <p:ph idx="1"/>
+          </p:nvPr>
+        </p:nvSpPr>
+        <p:spPr>
+          <a:xfrm>
+            <a:off x="609600" y="1524000"/>
+            <a:ext cx="10972800" cy="4953000"/>
+          </a:xfrm>
+        </p:spPr>
+        <p:txBody>
+          <a:bodyPr>
+            <a:normAutofit/>
+          </a:bodyPr>
+          <a:lstStyle/>
+          <a:p>
+            <a:r>
+              <a:rPr lang="en-US" sz="2000" b="1" dirty="0" err="1" smtClean="0"/>
+              <a:t>ApplicationStop</a:t>
+            </a:r>
+            <a:r>
+              <a:rPr lang="en-US" sz="2000" dirty="0" smtClean="0"/>
+              <a:t> </a:t>
+            </a:r>
+            <a:r>
+              <a:rPr lang="en-US" sz="2000" dirty="0"/>
+              <a:t>- used to gracefully stop the </a:t>
+            </a:r>
+            <a:r>
+              <a:rPr lang="en-US" sz="2000" dirty="0" smtClean="0"/>
+              <a:t>application/service.</a:t>
+            </a:r>
+          </a:p>
+          <a:p>
+            <a:r>
+              <a:rPr lang="en-US" sz="2000" b="1" dirty="0" err="1" smtClean="0"/>
+              <a:t>BeforeInstall</a:t>
+            </a:r>
+            <a:r>
+              <a:rPr lang="en-US" sz="2000" dirty="0" smtClean="0"/>
+              <a:t> </a:t>
+            </a:r>
+            <a:r>
+              <a:rPr lang="en-US" sz="2000" dirty="0"/>
+              <a:t>- typically used to create a backup of the current version, or delete all files from the target folder</a:t>
+            </a:r>
+          </a:p>
+          <a:p>
+            <a:r>
+              <a:rPr lang="en-US" sz="2000" b="1" dirty="0" err="1" smtClean="0"/>
+              <a:t>AfterInstall</a:t>
+            </a:r>
+            <a:r>
+              <a:rPr lang="en-US" sz="2000" dirty="0" smtClean="0"/>
+              <a:t> </a:t>
+            </a:r>
+            <a:r>
+              <a:rPr lang="en-US" sz="2000" dirty="0"/>
+              <a:t>- might be used to configure the application, set file permissions, or swap folders</a:t>
+            </a:r>
+          </a:p>
+          <a:p>
+            <a:r>
+              <a:rPr lang="en-US" sz="2000" b="1" dirty="0" err="1"/>
+              <a:t>ApplicationStart</a:t>
+            </a:r>
+            <a:r>
+              <a:rPr lang="en-US" sz="2000" dirty="0"/>
+              <a:t> - typically used to restart the </a:t>
+            </a:r>
+            <a:r>
+              <a:rPr lang="en-US" sz="2000" dirty="0" smtClean="0"/>
+              <a:t>application/service</a:t>
+            </a:r>
+            <a:endParaRPr lang="en-US" sz="2000" dirty="0"/>
+          </a:p>
+          <a:p>
+            <a:r>
+              <a:rPr lang="en-US" sz="2000" b="1" dirty="0" err="1"/>
+              <a:t>ValidateService</a:t>
+            </a:r>
+            <a:r>
+              <a:rPr lang="en-US" sz="2000" dirty="0"/>
+              <a:t> - typically used to verify the deployment was successful</a:t>
+            </a:r>
+          </a:p>
+        </p:txBody>
+      </p:sp>
+      <p:pic>
+        <p:nvPicPr>
+          <p:cNvPr id="4" name="Picture 3"/>
+          <p:cNvPicPr>
+            <a:picLocks noChangeAspect="1"/>
+          </p:cNvPicPr>
+          <p:nvPr/>
+        </p:nvPicPr>
+        <p:blipFill>
+          <a:blip r:embed="rId3">
+            <a:extLst>
+              <a:ext uri="{28A0092B-C50C-407E-A947-70E740481C1C}">
+                <a14:useLocalDpi xmlns:a14="http://schemas.microsoft.com/office/drawing/2010/main" val="0"/>
+              </a:ext>
+            </a:extLst>
+          </a:blip>
+          <a:stretch>
+            <a:fillRect/>
+          </a:stretch>
+        </p:blipFill>
+        <p:spPr>
+          <a:xfrm>
+            <a:off x="2947453" y="3720230"/>
+            <a:ext cx="5596863" cy="2632423"/>
+          </a:xfrm>
+          <a:prstGeom prst="rect">
+            <a:avLst/>
+          </a:prstGeom>
+        </p:spPr>
+      </p:pic>
+    </p:spTree>
+    <p:extLst>
+      <p:ext uri="{BB962C8B-B14F-4D97-AF65-F5344CB8AC3E}">
+        <p14:creationId xmlns:p14="http://schemas.microsoft.com/office/powerpoint/2010/main" val="297845441"/>
+      </p:ext>
+    </p:extLst>
+  </p:cSld>
+  <p:clrMapOvr>
+    <a:masterClrMapping/>
+  </p:clrMapOvr>
 </p:sld>
 </file>
 
@@ -9123,7 +9716,7 @@
   <a:extraClrSchemeLst/>
   <a:extLst>
     <a:ext uri="{05A4C25C-085E-4340-85A3-A5531E510DB2}">
-      <thm15:themeFamily xmlns:thm15="http://schemas.microsoft.com/office/thememl/2012/main" xmlns="" name="SolTech Presentation Template.potx" id="{B2176C02-E6F9-4DE0-BB06-907DC797FC17}" vid="{624E5072-2AE6-4041-A5DC-11FDAAF8553E}"/>
+      <thm15:themeFamily xmlns="" xmlns:thm15="http://schemas.microsoft.com/office/thememl/2012/main" name="SolTech Presentation Template.potx" id="{B2176C02-E6F9-4DE0-BB06-907DC797FC17}" vid="{624E5072-2AE6-4041-A5DC-11FDAAF8553E}"/>
     </a:ext>
   </a:extLst>
 </a:theme>

</xml_diff>